<commit_message>
finall update at HD
</commit_message>
<xml_diff>
--- a/录制回放工具介绍.pptx
+++ b/录制回放工具介绍.pptx
@@ -6,11 +6,13 @@
   </p:sldMasterIdLst>
   <p:sldIdLst>
     <p:sldId id="256" r:id="rId2"/>
-    <p:sldId id="274" r:id="rId3"/>
-    <p:sldId id="258" r:id="rId4"/>
-    <p:sldId id="276" r:id="rId5"/>
-    <p:sldId id="273" r:id="rId6"/>
-    <p:sldId id="275" r:id="rId7"/>
+    <p:sldId id="277" r:id="rId3"/>
+    <p:sldId id="278" r:id="rId4"/>
+    <p:sldId id="258" r:id="rId5"/>
+    <p:sldId id="276" r:id="rId6"/>
+    <p:sldId id="273" r:id="rId7"/>
+    <p:sldId id="274" r:id="rId8"/>
+    <p:sldId id="275" r:id="rId9"/>
   </p:sldIdLst>
   <p:sldSz cx="12192000" cy="6858000"/>
   <p:notesSz cx="6858000" cy="9144000"/>
@@ -840,7 +842,7 @@
             <a:fld id="{B61BEF0D-F0BB-DE4B-95CE-6DB70DBA9567}" type="datetimeFigureOut">
               <a:rPr lang="en-US" dirty="0"/>
               <a:pPr/>
-              <a:t>6/13/2018</a:t>
+              <a:t>6/19/2018</a:t>
             </a:fld>
             <a:endParaRPr lang="en-US" dirty="0"/>
           </a:p>
@@ -1088,7 +1090,7 @@
             <a:fld id="{B61BEF0D-F0BB-DE4B-95CE-6DB70DBA9567}" type="datetimeFigureOut">
               <a:rPr lang="en-US" dirty="0"/>
               <a:pPr/>
-              <a:t>6/13/2018</a:t>
+              <a:t>6/19/2018</a:t>
             </a:fld>
             <a:endParaRPr lang="en-US" dirty="0"/>
           </a:p>
@@ -1399,7 +1401,7 @@
             <a:fld id="{B61BEF0D-F0BB-DE4B-95CE-6DB70DBA9567}" type="datetimeFigureOut">
               <a:rPr lang="en-US" dirty="0"/>
               <a:pPr/>
-              <a:t>6/13/2018</a:t>
+              <a:t>6/19/2018</a:t>
             </a:fld>
             <a:endParaRPr lang="en-US" dirty="0"/>
           </a:p>
@@ -1737,7 +1739,7 @@
             <a:fld id="{B61BEF0D-F0BB-DE4B-95CE-6DB70DBA9567}" type="datetimeFigureOut">
               <a:rPr lang="en-US" dirty="0"/>
               <a:pPr/>
-              <a:t>6/13/2018</a:t>
+              <a:t>6/19/2018</a:t>
             </a:fld>
             <a:endParaRPr lang="en-US" dirty="0"/>
           </a:p>
@@ -2048,7 +2050,7 @@
             <a:fld id="{B61BEF0D-F0BB-DE4B-95CE-6DB70DBA9567}" type="datetimeFigureOut">
               <a:rPr lang="en-US" dirty="0"/>
               <a:pPr/>
-              <a:t>6/13/2018</a:t>
+              <a:t>6/19/2018</a:t>
             </a:fld>
             <a:endParaRPr lang="en-US" dirty="0"/>
           </a:p>
@@ -2438,7 +2440,7 @@
             <a:fld id="{B61BEF0D-F0BB-DE4B-95CE-6DB70DBA9567}" type="datetimeFigureOut">
               <a:rPr lang="en-US" dirty="0"/>
               <a:pPr/>
-              <a:t>6/13/2018</a:t>
+              <a:t>6/19/2018</a:t>
             </a:fld>
             <a:endParaRPr lang="en-US" dirty="0"/>
           </a:p>
@@ -2604,7 +2606,7 @@
           <a:p>
             <a:fld id="{55C6B4A9-1611-4792-9094-5F34BCA07E0B}" type="datetimeFigureOut">
               <a:rPr lang="en-US" dirty="0"/>
-              <a:t>6/13/2018</a:t>
+              <a:t>6/19/2018</a:t>
             </a:fld>
             <a:endParaRPr lang="en-US" dirty="0"/>
           </a:p>
@@ -2780,7 +2782,7 @@
             <a:fld id="{B61BEF0D-F0BB-DE4B-95CE-6DB70DBA9567}" type="datetimeFigureOut">
               <a:rPr lang="en-US" dirty="0"/>
               <a:pPr/>
-              <a:t>6/13/2018</a:t>
+              <a:t>6/19/2018</a:t>
             </a:fld>
             <a:endParaRPr lang="en-US" dirty="0"/>
           </a:p>
@@ -2953,7 +2955,7 @@
             <a:fld id="{B61BEF0D-F0BB-DE4B-95CE-6DB70DBA9567}" type="datetimeFigureOut">
               <a:rPr lang="en-US" dirty="0"/>
               <a:pPr/>
-              <a:t>6/13/2018</a:t>
+              <a:t>6/19/2018</a:t>
             </a:fld>
             <a:endParaRPr lang="en-US" dirty="0"/>
           </a:p>
@@ -3197,7 +3199,7 @@
             <a:fld id="{B61BEF0D-F0BB-DE4B-95CE-6DB70DBA9567}" type="datetimeFigureOut">
               <a:rPr lang="en-US" dirty="0"/>
               <a:pPr/>
-              <a:t>6/13/2018</a:t>
+              <a:t>6/19/2018</a:t>
             </a:fld>
             <a:endParaRPr lang="en-US" dirty="0"/>
           </a:p>
@@ -3425,7 +3427,7 @@
           <a:p>
             <a:fld id="{EB712588-04B1-427B-82EE-E8DB90309F08}" type="datetimeFigureOut">
               <a:rPr lang="en-US" dirty="0"/>
-              <a:t>6/13/2018</a:t>
+              <a:t>6/19/2018</a:t>
             </a:fld>
             <a:endParaRPr lang="en-US" dirty="0"/>
           </a:p>
@@ -3795,7 +3797,7 @@
             <a:fld id="{B61BEF0D-F0BB-DE4B-95CE-6DB70DBA9567}" type="datetimeFigureOut">
               <a:rPr lang="en-US" dirty="0"/>
               <a:pPr/>
-              <a:t>6/13/2018</a:t>
+              <a:t>6/19/2018</a:t>
             </a:fld>
             <a:endParaRPr lang="en-US" dirty="0"/>
           </a:p>
@@ -3915,7 +3917,7 @@
             <a:fld id="{B61BEF0D-F0BB-DE4B-95CE-6DB70DBA9567}" type="datetimeFigureOut">
               <a:rPr lang="en-US" dirty="0"/>
               <a:pPr/>
-              <a:t>6/13/2018</a:t>
+              <a:t>6/19/2018</a:t>
             </a:fld>
             <a:endParaRPr lang="en-US" dirty="0"/>
           </a:p>
@@ -4007,7 +4009,7 @@
             <a:fld id="{B61BEF0D-F0BB-DE4B-95CE-6DB70DBA9567}" type="datetimeFigureOut">
               <a:rPr lang="en-US" dirty="0"/>
               <a:pPr/>
-              <a:t>6/13/2018</a:t>
+              <a:t>6/19/2018</a:t>
             </a:fld>
             <a:endParaRPr lang="en-US" dirty="0"/>
           </a:p>
@@ -4258,7 +4260,7 @@
           <a:p>
             <a:fld id="{42A54C80-263E-416B-A8E0-580EDEADCBDC}" type="datetimeFigureOut">
               <a:rPr lang="en-US" dirty="0"/>
-              <a:t>6/13/2018</a:t>
+              <a:t>6/19/2018</a:t>
             </a:fld>
             <a:endParaRPr lang="en-US" dirty="0"/>
           </a:p>
@@ -4517,7 +4519,7 @@
             <a:fld id="{B61BEF0D-F0BB-DE4B-95CE-6DB70DBA9567}" type="datetimeFigureOut">
               <a:rPr lang="en-US" dirty="0"/>
               <a:pPr/>
-              <a:t>6/13/2018</a:t>
+              <a:t>6/19/2018</a:t>
             </a:fld>
             <a:endParaRPr lang="en-US" dirty="0"/>
           </a:p>
@@ -5257,7 +5259,7 @@
             <a:fld id="{B61BEF0D-F0BB-DE4B-95CE-6DB70DBA9567}" type="datetimeFigureOut">
               <a:rPr lang="en-US" dirty="0"/>
               <a:pPr/>
-              <a:t>6/13/2018</a:t>
+              <a:t>6/19/2018</a:t>
             </a:fld>
             <a:endParaRPr lang="en-US" dirty="0"/>
           </a:p>
@@ -5893,15 +5895,7 @@
             <a:pPr algn="l"/>
             <a:r>
               <a:rPr lang="zh-CN" altLang="en-US" sz="2400" dirty="0" smtClean="0"/>
-              <a:t>主要</a:t>
-            </a:r>
-            <a:r>
-              <a:rPr lang="zh-CN" altLang="en-US" sz="2400" smtClean="0"/>
-              <a:t>用途</a:t>
-            </a:r>
-            <a:r>
-              <a:rPr lang="zh-CN" altLang="en-US" sz="2400" smtClean="0"/>
-              <a:t>：</a:t>
+              <a:t>主要用途：</a:t>
             </a:r>
             <a:endParaRPr lang="en-US" altLang="zh-CN" sz="2400" dirty="0" smtClean="0"/>
           </a:p>
@@ -5944,126 +5938,6 @@
           <a:p>
             <a:pPr algn="l"/>
             <a:endParaRPr lang="en-US" altLang="zh-CN" sz="2400" dirty="0" smtClean="0"/>
-          </a:p>
-          <a:p>
-            <a:pPr algn="l"/>
-            <a:r>
-              <a:rPr lang="zh-CN" altLang="en-US" sz="2400" dirty="0"/>
-              <a:t>原理：</a:t>
-            </a:r>
-            <a:endParaRPr lang="en-US" altLang="zh-CN" sz="2400" dirty="0"/>
-          </a:p>
-          <a:p>
-            <a:pPr algn="l"/>
-            <a:r>
-              <a:rPr lang="en-US" altLang="zh-CN" sz="2000" dirty="0" smtClean="0"/>
-              <a:t>1.</a:t>
-            </a:r>
-            <a:r>
-              <a:rPr lang="zh-CN" altLang="en-US" sz="2000" dirty="0" smtClean="0"/>
-              <a:t>在稳定的版本</a:t>
-            </a:r>
-            <a:r>
-              <a:rPr lang="zh-CN" altLang="en-US" sz="2000" dirty="0"/>
-              <a:t>上</a:t>
-            </a:r>
-            <a:r>
-              <a:rPr lang="zh-CN" altLang="en-US" sz="2000" dirty="0" smtClean="0"/>
-              <a:t>录制小区平台的操作，得到记录文件；</a:t>
-            </a:r>
-            <a:endParaRPr lang="en-US" altLang="zh-CN" sz="2000" dirty="0" smtClean="0"/>
-          </a:p>
-          <a:p>
-            <a:pPr algn="l"/>
-            <a:r>
-              <a:rPr lang="en-US" altLang="zh-CN" sz="2000" dirty="0" smtClean="0"/>
-              <a:t>2.</a:t>
-            </a:r>
-            <a:r>
-              <a:rPr lang="zh-CN" altLang="en-US" sz="2000" dirty="0"/>
-              <a:t>在稳定的版本</a:t>
-            </a:r>
-            <a:r>
-              <a:rPr lang="zh-CN" altLang="en-US" sz="2000" dirty="0" smtClean="0"/>
-              <a:t>上回放小区</a:t>
-            </a:r>
-            <a:r>
-              <a:rPr lang="zh-CN" altLang="en-US" sz="2000" dirty="0"/>
-              <a:t>平台的操作，</a:t>
-            </a:r>
-            <a:r>
-              <a:rPr lang="zh-CN" altLang="en-US" sz="2000" dirty="0" smtClean="0"/>
-              <a:t>得到差异文件</a:t>
-            </a:r>
-            <a:r>
-              <a:rPr lang="zh-CN" altLang="en-US" sz="2000" dirty="0"/>
-              <a:t>；</a:t>
-            </a:r>
-            <a:endParaRPr lang="en-US" altLang="zh-CN" sz="2000" dirty="0"/>
-          </a:p>
-          <a:p>
-            <a:pPr algn="l"/>
-            <a:r>
-              <a:rPr lang="en-US" altLang="zh-CN" sz="2000" dirty="0" smtClean="0"/>
-              <a:t>3.</a:t>
-            </a:r>
-            <a:r>
-              <a:rPr lang="zh-CN" altLang="en-US" sz="2000" dirty="0" smtClean="0"/>
-              <a:t>在新建的</a:t>
-            </a:r>
-            <a:r>
-              <a:rPr lang="zh-CN" altLang="en-US" sz="2000" dirty="0"/>
-              <a:t>版本上回放小区平台的</a:t>
-            </a:r>
-            <a:r>
-              <a:rPr lang="zh-CN" altLang="en-US" sz="2000" dirty="0" smtClean="0"/>
-              <a:t>操作，</a:t>
-            </a:r>
-            <a:r>
-              <a:rPr lang="zh-CN" altLang="en-US" sz="2000" dirty="0"/>
-              <a:t>得到差异文件；</a:t>
-            </a:r>
-            <a:endParaRPr lang="en-US" altLang="zh-CN" sz="2000" dirty="0"/>
-          </a:p>
-          <a:p>
-            <a:pPr algn="l"/>
-            <a:r>
-              <a:rPr lang="en-US" altLang="zh-CN" sz="2000" dirty="0" smtClean="0"/>
-              <a:t>4.</a:t>
-            </a:r>
-            <a:r>
-              <a:rPr lang="zh-CN" altLang="en-US" sz="2000" dirty="0" smtClean="0"/>
-              <a:t>对比差异文件，得到</a:t>
-            </a:r>
-            <a:r>
-              <a:rPr lang="zh-CN" altLang="en-US" sz="2000" dirty="0"/>
-              <a:t>差异报告</a:t>
-            </a:r>
-            <a:r>
-              <a:rPr lang="zh-CN" altLang="en-US" sz="2000" dirty="0" smtClean="0"/>
-              <a:t>，逐一</a:t>
-            </a:r>
-            <a:r>
-              <a:rPr lang="zh-CN" altLang="en-US" sz="2000" dirty="0"/>
-              <a:t>确认差异项</a:t>
-            </a:r>
-            <a:r>
-              <a:rPr lang="zh-CN" altLang="en-US" sz="2000" dirty="0" smtClean="0"/>
-              <a:t>，得到新</a:t>
-            </a:r>
-            <a:r>
-              <a:rPr lang="zh-CN" altLang="en-US" sz="2000" dirty="0"/>
-              <a:t>版本的</a:t>
-            </a:r>
-            <a:r>
-              <a:rPr lang="en-US" altLang="zh-CN" sz="2000" dirty="0"/>
-              <a:t>BUG</a:t>
-            </a:r>
-            <a:r>
-              <a:rPr lang="zh-CN" altLang="en-US" sz="2000" dirty="0"/>
-              <a:t>。</a:t>
-            </a:r>
-            <a:endParaRPr lang="en-US" altLang="zh-CN" sz="2000" dirty="0"/>
           </a:p>
           <a:p>
             <a:pPr algn="l"/>
@@ -6078,7 +5952,7 @@
     </p:spTree>
     <p:extLst>
       <p:ext uri="{BB962C8B-B14F-4D97-AF65-F5344CB8AC3E}">
-        <p14:creationId xmlns:p14="http://schemas.microsoft.com/office/powerpoint/2010/main" val="2601795849"/>
+        <p14:creationId xmlns:p14="http://schemas.microsoft.com/office/powerpoint/2010/main" val="2875384530"/>
       </p:ext>
     </p:extLst>
   </p:cSld>
@@ -6096,6 +5970,198 @@
 </file>
 
 <file path=ppt/slides/slide3.xml><?xml version="1.0" encoding="utf-8"?>
+<p:sld xmlns:a="http://schemas.openxmlformats.org/drawingml/2006/main" xmlns:r="http://schemas.openxmlformats.org/officeDocument/2006/relationships" xmlns:p="http://schemas.openxmlformats.org/presentationml/2006/main">
+  <p:cSld>
+    <p:spTree>
+      <p:nvGrpSpPr>
+        <p:cNvPr id="1" name=""/>
+        <p:cNvGrpSpPr/>
+        <p:nvPr/>
+      </p:nvGrpSpPr>
+      <p:grpSpPr>
+        <a:xfrm>
+          <a:off x="0" y="0"/>
+          <a:ext cx="0" cy="0"/>
+          <a:chOff x="0" y="0"/>
+          <a:chExt cx="0" cy="0"/>
+        </a:xfrm>
+      </p:grpSpPr>
+      <p:sp>
+        <p:nvSpPr>
+          <p:cNvPr id="3" name="副标题 2"/>
+          <p:cNvSpPr>
+            <a:spLocks noGrp="1"/>
+          </p:cNvSpPr>
+          <p:nvPr>
+            <p:ph type="subTitle" idx="1"/>
+          </p:nvPr>
+        </p:nvSpPr>
+        <p:spPr>
+          <a:xfrm>
+            <a:off x="732151" y="896928"/>
+            <a:ext cx="8644324" cy="4535228"/>
+          </a:xfrm>
+        </p:spPr>
+        <p:txBody>
+          <a:bodyPr>
+            <a:normAutofit/>
+          </a:bodyPr>
+          <a:lstStyle/>
+          <a:p>
+            <a:pPr algn="l"/>
+            <a:endParaRPr lang="en-US" altLang="zh-CN" sz="2400" dirty="0" smtClean="0"/>
+          </a:p>
+          <a:p>
+            <a:pPr algn="l"/>
+            <a:r>
+              <a:rPr lang="zh-CN" altLang="en-US" sz="2400" dirty="0"/>
+              <a:t>原理：</a:t>
+            </a:r>
+            <a:endParaRPr lang="en-US" altLang="zh-CN" sz="2400" dirty="0"/>
+          </a:p>
+          <a:p>
+            <a:pPr algn="l"/>
+            <a:r>
+              <a:rPr lang="en-US" altLang="zh-CN" sz="2000" dirty="0" smtClean="0"/>
+              <a:t>1.</a:t>
+            </a:r>
+            <a:r>
+              <a:rPr lang="zh-CN" altLang="en-US" sz="2000" dirty="0" smtClean="0"/>
+              <a:t>在稳定的版本</a:t>
+            </a:r>
+            <a:r>
+              <a:rPr lang="zh-CN" altLang="en-US" sz="2000" dirty="0"/>
+              <a:t>上</a:t>
+            </a:r>
+            <a:r>
+              <a:rPr lang="zh-CN" altLang="en-US" sz="2000" dirty="0" smtClean="0"/>
+              <a:t>录制小区平台的操作，得到记录文件；</a:t>
+            </a:r>
+            <a:endParaRPr lang="en-US" altLang="zh-CN" sz="2000" dirty="0" smtClean="0"/>
+          </a:p>
+          <a:p>
+            <a:pPr algn="l"/>
+            <a:r>
+              <a:rPr lang="en-US" altLang="zh-CN" sz="2000" dirty="0" smtClean="0"/>
+              <a:t>2.</a:t>
+            </a:r>
+            <a:r>
+              <a:rPr lang="zh-CN" altLang="en-US" sz="2000" dirty="0"/>
+              <a:t>在稳定的版本</a:t>
+            </a:r>
+            <a:r>
+              <a:rPr lang="zh-CN" altLang="en-US" sz="2000" dirty="0" smtClean="0"/>
+              <a:t>上回放小区</a:t>
+            </a:r>
+            <a:r>
+              <a:rPr lang="zh-CN" altLang="en-US" sz="2000" dirty="0"/>
+              <a:t>平台的操作，</a:t>
+            </a:r>
+            <a:r>
+              <a:rPr lang="zh-CN" altLang="en-US" sz="2000" dirty="0" smtClean="0"/>
+              <a:t>得到差异文件</a:t>
+            </a:r>
+            <a:r>
+              <a:rPr lang="zh-CN" altLang="en-US" sz="2000" dirty="0"/>
+              <a:t>；</a:t>
+            </a:r>
+            <a:endParaRPr lang="en-US" altLang="zh-CN" sz="2000" dirty="0"/>
+          </a:p>
+          <a:p>
+            <a:pPr algn="l"/>
+            <a:r>
+              <a:rPr lang="en-US" altLang="zh-CN" sz="2000" dirty="0" smtClean="0"/>
+              <a:t>3.</a:t>
+            </a:r>
+            <a:r>
+              <a:rPr lang="zh-CN" altLang="en-US" sz="2000" dirty="0" smtClean="0"/>
+              <a:t>在新建的</a:t>
+            </a:r>
+            <a:r>
+              <a:rPr lang="zh-CN" altLang="en-US" sz="2000" dirty="0"/>
+              <a:t>版本上回放小区平台的</a:t>
+            </a:r>
+            <a:r>
+              <a:rPr lang="zh-CN" altLang="en-US" sz="2000" dirty="0" smtClean="0"/>
+              <a:t>操作，</a:t>
+            </a:r>
+            <a:r>
+              <a:rPr lang="zh-CN" altLang="en-US" sz="2000" dirty="0"/>
+              <a:t>得到差异文件；</a:t>
+            </a:r>
+            <a:endParaRPr lang="en-US" altLang="zh-CN" sz="2000" dirty="0"/>
+          </a:p>
+          <a:p>
+            <a:pPr algn="l"/>
+            <a:r>
+              <a:rPr lang="en-US" altLang="zh-CN" sz="2000" dirty="0" smtClean="0"/>
+              <a:t>4.</a:t>
+            </a:r>
+            <a:r>
+              <a:rPr lang="zh-CN" altLang="en-US" sz="2000" dirty="0" smtClean="0"/>
+              <a:t>对比差异文件，得到</a:t>
+            </a:r>
+            <a:r>
+              <a:rPr lang="zh-CN" altLang="en-US" sz="2000" dirty="0"/>
+              <a:t>差异报告</a:t>
+            </a:r>
+            <a:r>
+              <a:rPr lang="zh-CN" altLang="en-US" sz="2000" dirty="0" smtClean="0"/>
+              <a:t>，逐一</a:t>
+            </a:r>
+            <a:r>
+              <a:rPr lang="zh-CN" altLang="en-US" sz="2000" dirty="0"/>
+              <a:t>确认差异项</a:t>
+            </a:r>
+            <a:r>
+              <a:rPr lang="zh-CN" altLang="en-US" sz="2000" dirty="0" smtClean="0"/>
+              <a:t>，得到新</a:t>
+            </a:r>
+            <a:r>
+              <a:rPr lang="zh-CN" altLang="en-US" sz="2000" dirty="0"/>
+              <a:t>版本的</a:t>
+            </a:r>
+            <a:r>
+              <a:rPr lang="en-US" altLang="zh-CN" sz="2000" dirty="0"/>
+              <a:t>BUG</a:t>
+            </a:r>
+            <a:r>
+              <a:rPr lang="zh-CN" altLang="en-US" sz="2000" dirty="0"/>
+              <a:t>。</a:t>
+            </a:r>
+            <a:endParaRPr lang="en-US" altLang="zh-CN" sz="2000" dirty="0"/>
+          </a:p>
+          <a:p>
+            <a:pPr algn="l"/>
+            <a:endParaRPr lang="en-US" altLang="zh-CN" sz="2400" dirty="0"/>
+          </a:p>
+          <a:p>
+            <a:pPr algn="l"/>
+            <a:endParaRPr lang="en-US" altLang="zh-CN" sz="2400" dirty="0" smtClean="0"/>
+          </a:p>
+        </p:txBody>
+      </p:sp>
+    </p:spTree>
+    <p:extLst>
+      <p:ext uri="{BB962C8B-B14F-4D97-AF65-F5344CB8AC3E}">
+        <p14:creationId xmlns:p14="http://schemas.microsoft.com/office/powerpoint/2010/main" val="2994143488"/>
+      </p:ext>
+    </p:extLst>
+  </p:cSld>
+  <p:clrMapOvr>
+    <a:masterClrMapping/>
+  </p:clrMapOvr>
+  <p:timing>
+    <p:tnLst>
+      <p:par>
+        <p:cTn id="1" dur="indefinite" restart="never" nodeType="tmRoot"/>
+      </p:par>
+    </p:tnLst>
+  </p:timing>
+</p:sld>
+</file>
+
+<file path=ppt/slides/slide4.xml><?xml version="1.0" encoding="utf-8"?>
 <p:sld xmlns:a="http://schemas.openxmlformats.org/drawingml/2006/main" xmlns:r="http://schemas.openxmlformats.org/officeDocument/2006/relationships" xmlns:p="http://schemas.openxmlformats.org/presentationml/2006/main">
   <p:cSld>
     <p:spTree>
@@ -6271,7 +6337,7 @@
         <p:spPr>
           <a:xfrm>
             <a:off x="3815574" y="87465"/>
-            <a:ext cx="1386257" cy="461665"/>
+            <a:ext cx="2050534" cy="461665"/>
           </a:xfrm>
           <a:prstGeom prst="rect">
             <a:avLst/>
@@ -6285,12 +6351,20 @@
           <a:lstStyle/>
           <a:p>
             <a:r>
-              <a:rPr lang="zh-CN" altLang="en-US" sz="2400" dirty="0">
+              <a:rPr lang="zh-CN" altLang="en-US" sz="2400" dirty="0" smtClean="0">
                 <a:solidFill>
                   <a:schemeClr val="accent4"/>
                 </a:solidFill>
               </a:rPr>
-              <a:t>逻辑</a:t>
+              <a:t>原理</a:t>
+            </a:r>
+            <a:r>
+              <a:rPr lang="en-US" altLang="zh-CN" sz="2400" dirty="0" smtClean="0">
+                <a:solidFill>
+                  <a:schemeClr val="accent4"/>
+                </a:solidFill>
+              </a:rPr>
+              <a:t>-</a:t>
             </a:r>
             <a:r>
               <a:rPr lang="zh-CN" altLang="en-US" sz="2400" dirty="0" smtClean="0">
@@ -6298,7 +6372,15 @@
                   <a:schemeClr val="accent4"/>
                 </a:solidFill>
               </a:rPr>
-              <a:t>图：</a:t>
+              <a:t>逻辑图</a:t>
+            </a:r>
+            <a:r>
+              <a:rPr lang="zh-CN" altLang="en-US" sz="2400" dirty="0" smtClean="0">
+                <a:solidFill>
+                  <a:schemeClr val="accent4"/>
+                </a:solidFill>
+              </a:rPr>
+              <a:t>：</a:t>
             </a:r>
             <a:endParaRPr lang="zh-CN" altLang="en-US" sz="2400" b="1" dirty="0">
               <a:solidFill>
@@ -8636,7 +8718,7 @@
 </p:sld>
 </file>
 
-<file path=ppt/slides/slide4.xml><?xml version="1.0" encoding="utf-8"?>
+<file path=ppt/slides/slide5.xml><?xml version="1.0" encoding="utf-8"?>
 <p:sld xmlns:a="http://schemas.openxmlformats.org/drawingml/2006/main" xmlns:r="http://schemas.openxmlformats.org/officeDocument/2006/relationships" xmlns:p="http://schemas.openxmlformats.org/presentationml/2006/main">
   <p:cSld>
     <p:spTree>
@@ -8662,7 +8744,7 @@
         <p:spPr>
           <a:xfrm>
             <a:off x="3815574" y="87465"/>
-            <a:ext cx="1386257" cy="461665"/>
+            <a:ext cx="2515484" cy="461665"/>
           </a:xfrm>
           <a:prstGeom prst="rect">
             <a:avLst/>
@@ -8681,7 +8763,31 @@
                   <a:schemeClr val="accent4"/>
                 </a:solidFill>
               </a:rPr>
-              <a:t>示例：</a:t>
+              <a:t>原理</a:t>
+            </a:r>
+            <a:r>
+              <a:rPr lang="en-US" altLang="zh-CN" sz="2400" dirty="0" smtClean="0">
+                <a:solidFill>
+                  <a:schemeClr val="accent4"/>
+                </a:solidFill>
+              </a:rPr>
+              <a:t>-</a:t>
+            </a:r>
+            <a:r>
+              <a:rPr lang="zh-CN" altLang="en-US" sz="2400" dirty="0" smtClean="0">
+                <a:solidFill>
+                  <a:schemeClr val="accent4"/>
+                </a:solidFill>
+              </a:rPr>
+              <a:t>示例</a:t>
+            </a:r>
+            <a:r>
+              <a:rPr lang="zh-CN" altLang="en-US" sz="2400" dirty="0" smtClean="0">
+                <a:solidFill>
+                  <a:schemeClr val="accent4"/>
+                </a:solidFill>
+              </a:rPr>
+              <a:t>：</a:t>
             </a:r>
             <a:endParaRPr lang="zh-CN" altLang="en-US" sz="2400" b="1" dirty="0">
               <a:solidFill>
@@ -8884,7 +8990,7 @@
 </p:sld>
 </file>
 
-<file path=ppt/slides/slide5.xml><?xml version="1.0" encoding="utf-8"?>
+<file path=ppt/slides/slide6.xml><?xml version="1.0" encoding="utf-8"?>
 <p:sld xmlns:a="http://schemas.openxmlformats.org/drawingml/2006/main" xmlns:r="http://schemas.openxmlformats.org/officeDocument/2006/relationships" xmlns:p="http://schemas.openxmlformats.org/presentationml/2006/main">
   <p:cSld>
     <p:spTree>
@@ -9498,7 +9604,323 @@
 </p:sld>
 </file>
 
-<file path=ppt/slides/slide6.xml><?xml version="1.0" encoding="utf-8"?>
+<file path=ppt/slides/slide7.xml><?xml version="1.0" encoding="utf-8"?>
+<p:sld xmlns:a="http://schemas.openxmlformats.org/drawingml/2006/main" xmlns:r="http://schemas.openxmlformats.org/officeDocument/2006/relationships" xmlns:p="http://schemas.openxmlformats.org/presentationml/2006/main">
+  <p:cSld>
+    <p:spTree>
+      <p:nvGrpSpPr>
+        <p:cNvPr id="1" name=""/>
+        <p:cNvGrpSpPr/>
+        <p:nvPr/>
+      </p:nvGrpSpPr>
+      <p:grpSpPr>
+        <a:xfrm>
+          <a:off x="0" y="0"/>
+          <a:ext cx="0" cy="0"/>
+          <a:chOff x="0" y="0"/>
+          <a:chExt cx="0" cy="0"/>
+        </a:xfrm>
+      </p:grpSpPr>
+      <p:sp>
+        <p:nvSpPr>
+          <p:cNvPr id="3" name="副标题 2"/>
+          <p:cNvSpPr>
+            <a:spLocks noGrp="1"/>
+          </p:cNvSpPr>
+          <p:nvPr>
+            <p:ph type="subTitle" idx="1"/>
+          </p:nvPr>
+        </p:nvSpPr>
+        <p:spPr>
+          <a:xfrm>
+            <a:off x="732151" y="896928"/>
+            <a:ext cx="8644324" cy="4535228"/>
+          </a:xfrm>
+        </p:spPr>
+        <p:txBody>
+          <a:bodyPr>
+            <a:normAutofit fontScale="92500" lnSpcReduction="10000"/>
+          </a:bodyPr>
+          <a:lstStyle/>
+          <a:p>
+            <a:pPr algn="l"/>
+            <a:r>
+              <a:rPr lang="zh-CN" altLang="en-US" sz="2400" dirty="0" smtClean="0"/>
+              <a:t>安装与使用</a:t>
+            </a:r>
+            <a:r>
+              <a:rPr lang="zh-CN" altLang="en-US" sz="2400" dirty="0" smtClean="0"/>
+              <a:t>：</a:t>
+            </a:r>
+            <a:endParaRPr lang="en-US" altLang="zh-CN" sz="2400" dirty="0" smtClean="0"/>
+          </a:p>
+          <a:p>
+            <a:pPr algn="l"/>
+            <a:r>
+              <a:rPr lang="en-US" altLang="zh-CN" sz="2400" dirty="0"/>
+              <a:t>	1. </a:t>
+            </a:r>
+            <a:r>
+              <a:rPr lang="zh-CN" altLang="en-US" sz="2400" dirty="0"/>
+              <a:t>解</a:t>
+            </a:r>
+            <a:r>
+              <a:rPr lang="zh-CN" altLang="en-US" sz="2400" dirty="0" smtClean="0"/>
+              <a:t>压</a:t>
+            </a:r>
+            <a:r>
+              <a:rPr lang="en-US" altLang="zh-CN" sz="2400" dirty="0" err="1" smtClean="0"/>
+              <a:t>replayit.rar</a:t>
+            </a:r>
+            <a:r>
+              <a:rPr lang="zh-CN" altLang="en-US" sz="2400" dirty="0" smtClean="0"/>
+              <a:t>到</a:t>
+            </a:r>
+            <a:r>
+              <a:rPr lang="en-US" altLang="zh-CN" sz="2400" dirty="0" smtClean="0"/>
+              <a:t>C</a:t>
+            </a:r>
+            <a:r>
+              <a:rPr lang="zh-CN" altLang="en-US" sz="2400" dirty="0" smtClean="0"/>
+              <a:t>盘；</a:t>
+            </a:r>
+            <a:endParaRPr lang="en-US" altLang="zh-CN" sz="2400" dirty="0" smtClean="0"/>
+          </a:p>
+          <a:p>
+            <a:pPr algn="l"/>
+            <a:r>
+              <a:rPr lang="en-US" altLang="zh-CN" sz="2400" dirty="0"/>
+              <a:t>	</a:t>
+            </a:r>
+            <a:r>
+              <a:rPr lang="en-US" altLang="zh-CN" sz="2400" dirty="0"/>
+              <a:t>2</a:t>
+            </a:r>
+            <a:r>
+              <a:rPr lang="en-US" altLang="zh-CN" sz="2400" dirty="0" smtClean="0"/>
+              <a:t>. </a:t>
+            </a:r>
+            <a:r>
+              <a:rPr lang="zh-CN" altLang="en-US" sz="2400" dirty="0" smtClean="0"/>
+              <a:t>双击</a:t>
+            </a:r>
+            <a:r>
+              <a:rPr lang="zh-CN" altLang="en-US" sz="2400" dirty="0" smtClean="0"/>
+              <a:t>安装 </a:t>
+            </a:r>
+            <a:r>
+              <a:rPr lang="en-US" altLang="zh-CN" sz="2400" dirty="0" smtClean="0"/>
+              <a:t>FiddlerSetup.exe</a:t>
+            </a:r>
+            <a:r>
+              <a:rPr lang="zh-CN" altLang="en-US" sz="2400" dirty="0"/>
+              <a:t>；</a:t>
+            </a:r>
+            <a:endParaRPr lang="en-US" altLang="zh-CN" sz="2400" dirty="0"/>
+          </a:p>
+          <a:p>
+            <a:pPr algn="l"/>
+            <a:r>
+              <a:rPr lang="en-US" altLang="zh-CN" sz="2400" dirty="0" smtClean="0"/>
+              <a:t>	</a:t>
+            </a:r>
+            <a:r>
+              <a:rPr lang="en-US" altLang="zh-CN" sz="2400" dirty="0" smtClean="0"/>
+              <a:t>3. </a:t>
+            </a:r>
+            <a:r>
+              <a:rPr lang="zh-CN" altLang="en-US" sz="2400" dirty="0" smtClean="0"/>
+              <a:t>用</a:t>
+            </a:r>
+            <a:r>
+              <a:rPr lang="en-US" altLang="zh-CN" sz="2400" dirty="0"/>
+              <a:t>C:\replayit\fiddlerjs\fiddler.js</a:t>
+            </a:r>
+            <a:r>
+              <a:rPr lang="zh-CN" altLang="en-US" sz="2400" dirty="0" smtClean="0"/>
+              <a:t>替换掉</a:t>
+            </a:r>
+            <a:r>
+              <a:rPr lang="en-US" altLang="zh-CN" sz="2400" dirty="0"/>
+              <a:t>C:\Users</a:t>
+            </a:r>
+            <a:r>
+              <a:rPr lang="en-US" altLang="zh-CN" sz="2400" dirty="0" smtClean="0"/>
+              <a:t>\</a:t>
+            </a:r>
+            <a:r>
+              <a:rPr lang="zh-CN" altLang="en-US" sz="2400" dirty="0" smtClean="0"/>
+              <a:t>用户名</a:t>
+            </a:r>
+            <a:r>
+              <a:rPr lang="en-US" altLang="zh-CN" sz="2400" dirty="0"/>
+              <a:t>\</a:t>
+            </a:r>
+            <a:r>
+              <a:rPr lang="en-US" altLang="zh-CN" sz="2400" dirty="0" smtClean="0"/>
+              <a:t>Documents\Fiddler2\Scripts\CustomRules.js </a:t>
+            </a:r>
+            <a:r>
+              <a:rPr lang="zh-CN" altLang="en-US" sz="2400" dirty="0" smtClean="0"/>
+              <a:t>；</a:t>
+            </a:r>
+            <a:endParaRPr lang="en-US" altLang="zh-CN" sz="2400" dirty="0" smtClean="0"/>
+          </a:p>
+          <a:p>
+            <a:pPr algn="l"/>
+            <a:r>
+              <a:rPr lang="en-US" altLang="zh-CN" sz="2400" dirty="0"/>
+              <a:t>	</a:t>
+            </a:r>
+            <a:r>
+              <a:rPr lang="en-US" altLang="zh-CN" sz="2400" dirty="0" smtClean="0"/>
+              <a:t>4. </a:t>
+            </a:r>
+            <a:r>
+              <a:rPr lang="zh-CN" altLang="en-US" sz="2400" dirty="0" smtClean="0"/>
+              <a:t>启动</a:t>
+            </a:r>
+            <a:r>
+              <a:rPr lang="en-US" altLang="zh-CN" sz="2400" dirty="0" smtClean="0"/>
+              <a:t>Fiddler</a:t>
+            </a:r>
+            <a:r>
+              <a:rPr lang="zh-CN" altLang="en-US" sz="2400" dirty="0" smtClean="0"/>
+              <a:t>录制，得到</a:t>
+            </a:r>
+            <a:r>
+              <a:rPr lang="en-US" altLang="zh-CN" sz="2400" dirty="0"/>
+              <a:t>C:\replayit\records\refuse.gor</a:t>
+            </a:r>
+            <a:r>
+              <a:rPr lang="zh-CN" altLang="en-US" sz="2400" dirty="0" smtClean="0"/>
+              <a:t>；</a:t>
+            </a:r>
+            <a:endParaRPr lang="en-US" altLang="zh-CN" sz="2400" dirty="0" smtClean="0"/>
+          </a:p>
+          <a:p>
+            <a:pPr algn="l"/>
+            <a:r>
+              <a:rPr lang="en-US" altLang="zh-CN" sz="2400" dirty="0"/>
+              <a:t>	</a:t>
+            </a:r>
+            <a:r>
+              <a:rPr lang="en-US" altLang="zh-CN" sz="2400" dirty="0" smtClean="0"/>
+              <a:t>5. </a:t>
+            </a:r>
+            <a:r>
+              <a:rPr lang="zh-CN" altLang="en-US" sz="2400" dirty="0" smtClean="0"/>
+              <a:t>将</a:t>
+            </a:r>
+            <a:r>
+              <a:rPr lang="en-US" altLang="zh-CN" sz="2400" dirty="0" err="1" smtClean="0"/>
+              <a:t>refuse.gor</a:t>
+            </a:r>
+            <a:r>
+              <a:rPr lang="zh-CN" altLang="en-US" sz="2400" dirty="0" smtClean="0"/>
+              <a:t>重命名为</a:t>
+            </a:r>
+            <a:r>
+              <a:rPr lang="en-US" altLang="zh-CN" sz="2400" dirty="0" err="1" smtClean="0"/>
+              <a:t>xxx.gor</a:t>
+            </a:r>
+            <a:r>
+              <a:rPr lang="zh-CN" altLang="en-US" sz="2400" dirty="0" smtClean="0"/>
+              <a:t>并在</a:t>
+            </a:r>
+            <a:r>
+              <a:rPr lang="en-US" altLang="zh-CN" sz="2400" dirty="0"/>
+              <a:t>C:\</a:t>
+            </a:r>
+            <a:r>
+              <a:rPr lang="en-US" altLang="zh-CN" sz="2400" dirty="0" smtClean="0"/>
+              <a:t>replayit\fitters</a:t>
+            </a:r>
+            <a:r>
+              <a:rPr lang="zh-CN" altLang="en-US" sz="2400" dirty="0" smtClean="0"/>
+              <a:t>目录下创建</a:t>
+            </a:r>
+            <a:r>
+              <a:rPr lang="en-US" altLang="zh-CN" sz="2400" dirty="0" smtClean="0"/>
+              <a:t>xxx_fitter.py</a:t>
+            </a:r>
+            <a:r>
+              <a:rPr lang="zh-CN" altLang="en-US" sz="2400" dirty="0" smtClean="0"/>
+              <a:t>文件；</a:t>
+            </a:r>
+            <a:endParaRPr lang="en-US" altLang="zh-CN" sz="2400" dirty="0" smtClean="0"/>
+          </a:p>
+          <a:p>
+            <a:pPr algn="l"/>
+            <a:r>
+              <a:rPr lang="en-US" altLang="zh-CN" sz="2400" dirty="0"/>
+              <a:t> </a:t>
+            </a:r>
+            <a:r>
+              <a:rPr lang="en-US" altLang="zh-CN" sz="2400" dirty="0" smtClean="0"/>
+              <a:t> 	</a:t>
+            </a:r>
+            <a:r>
+              <a:rPr lang="en-US" altLang="zh-CN" sz="2400" dirty="0" smtClean="0"/>
+              <a:t>6. </a:t>
+            </a:r>
+            <a:r>
+              <a:rPr lang="zh-CN" altLang="en-US" sz="2400" dirty="0" smtClean="0"/>
+              <a:t>回放：</a:t>
+            </a:r>
+            <a:r>
+              <a:rPr lang="en-US" altLang="zh-CN" sz="2400" dirty="0"/>
+              <a:t>C:\replayit&gt;python3 replayit.py -f </a:t>
+            </a:r>
+            <a:r>
+              <a:rPr lang="en-US" altLang="zh-CN" sz="2400" dirty="0" err="1"/>
+              <a:t>test.gor</a:t>
+            </a:r>
+            <a:endParaRPr lang="en-US" altLang="zh-CN" sz="2400" dirty="0" smtClean="0"/>
+          </a:p>
+          <a:p>
+            <a:pPr algn="l"/>
+            <a:endParaRPr lang="en-US" altLang="zh-CN" sz="2400" dirty="0" smtClean="0"/>
+          </a:p>
+          <a:p>
+            <a:pPr algn="l"/>
+            <a:r>
+              <a:rPr lang="zh-CN" altLang="en-US" sz="2000" dirty="0" smtClean="0"/>
+              <a:t>。</a:t>
+            </a:r>
+            <a:endParaRPr lang="en-US" altLang="zh-CN" sz="2000" dirty="0"/>
+          </a:p>
+          <a:p>
+            <a:pPr algn="l"/>
+            <a:endParaRPr lang="en-US" altLang="zh-CN" sz="2400" dirty="0"/>
+          </a:p>
+          <a:p>
+            <a:pPr algn="l"/>
+            <a:endParaRPr lang="en-US" altLang="zh-CN" sz="2400" dirty="0" smtClean="0"/>
+          </a:p>
+        </p:txBody>
+      </p:sp>
+    </p:spTree>
+    <p:extLst>
+      <p:ext uri="{BB962C8B-B14F-4D97-AF65-F5344CB8AC3E}">
+        <p14:creationId xmlns:p14="http://schemas.microsoft.com/office/powerpoint/2010/main" val="2601795849"/>
+      </p:ext>
+    </p:extLst>
+  </p:cSld>
+  <p:clrMapOvr>
+    <a:masterClrMapping/>
+  </p:clrMapOvr>
+  <p:timing>
+    <p:tnLst>
+      <p:par>
+        <p:cTn id="1" dur="indefinite" restart="never" nodeType="tmRoot"/>
+      </p:par>
+    </p:tnLst>
+  </p:timing>
+</p:sld>
+</file>
+
+<file path=ppt/slides/slide8.xml><?xml version="1.0" encoding="utf-8"?>
 <p:sld xmlns:a="http://schemas.openxmlformats.org/drawingml/2006/main" xmlns:r="http://schemas.openxmlformats.org/officeDocument/2006/relationships" xmlns:p="http://schemas.openxmlformats.org/presentationml/2006/main">
   <p:cSld>
     <p:spTree>

</xml_diff>